<commit_message>
Comportamiento Buscar comida y devorar
</commit_message>
<xml_diff>
--- a/Tukisland.pptx
+++ b/Tukisland.pptx
@@ -261,7 +261,7 @@
           <a:p>
             <a:fld id="{23423902-E5F6-4A0D-9A81-A9BF902CCB85}" type="datetimeFigureOut">
               <a:rPr lang="es-ES" smtClean="0"/>
-              <a:t>17/05/2021</a:t>
+              <a:t>23/05/2021</a:t>
             </a:fld>
             <a:endParaRPr lang="es-ES"/>
           </a:p>
@@ -459,7 +459,7 @@
           <a:p>
             <a:fld id="{23423902-E5F6-4A0D-9A81-A9BF902CCB85}" type="datetimeFigureOut">
               <a:rPr lang="es-ES" smtClean="0"/>
-              <a:t>17/05/2021</a:t>
+              <a:t>23/05/2021</a:t>
             </a:fld>
             <a:endParaRPr lang="es-ES"/>
           </a:p>
@@ -667,7 +667,7 @@
           <a:p>
             <a:fld id="{23423902-E5F6-4A0D-9A81-A9BF902CCB85}" type="datetimeFigureOut">
               <a:rPr lang="es-ES" smtClean="0"/>
-              <a:t>17/05/2021</a:t>
+              <a:t>23/05/2021</a:t>
             </a:fld>
             <a:endParaRPr lang="es-ES"/>
           </a:p>
@@ -865,7 +865,7 @@
           <a:p>
             <a:fld id="{23423902-E5F6-4A0D-9A81-A9BF902CCB85}" type="datetimeFigureOut">
               <a:rPr lang="es-ES" smtClean="0"/>
-              <a:t>17/05/2021</a:t>
+              <a:t>23/05/2021</a:t>
             </a:fld>
             <a:endParaRPr lang="es-ES"/>
           </a:p>
@@ -1140,7 +1140,7 @@
           <a:p>
             <a:fld id="{23423902-E5F6-4A0D-9A81-A9BF902CCB85}" type="datetimeFigureOut">
               <a:rPr lang="es-ES" smtClean="0"/>
-              <a:t>17/05/2021</a:t>
+              <a:t>23/05/2021</a:t>
             </a:fld>
             <a:endParaRPr lang="es-ES"/>
           </a:p>
@@ -1405,7 +1405,7 @@
           <a:p>
             <a:fld id="{23423902-E5F6-4A0D-9A81-A9BF902CCB85}" type="datetimeFigureOut">
               <a:rPr lang="es-ES" smtClean="0"/>
-              <a:t>17/05/2021</a:t>
+              <a:t>23/05/2021</a:t>
             </a:fld>
             <a:endParaRPr lang="es-ES"/>
           </a:p>
@@ -1817,7 +1817,7 @@
           <a:p>
             <a:fld id="{23423902-E5F6-4A0D-9A81-A9BF902CCB85}" type="datetimeFigureOut">
               <a:rPr lang="es-ES" smtClean="0"/>
-              <a:t>17/05/2021</a:t>
+              <a:t>23/05/2021</a:t>
             </a:fld>
             <a:endParaRPr lang="es-ES"/>
           </a:p>
@@ -1958,7 +1958,7 @@
           <a:p>
             <a:fld id="{23423902-E5F6-4A0D-9A81-A9BF902CCB85}" type="datetimeFigureOut">
               <a:rPr lang="es-ES" smtClean="0"/>
-              <a:t>17/05/2021</a:t>
+              <a:t>23/05/2021</a:t>
             </a:fld>
             <a:endParaRPr lang="es-ES"/>
           </a:p>
@@ -2071,7 +2071,7 @@
           <a:p>
             <a:fld id="{23423902-E5F6-4A0D-9A81-A9BF902CCB85}" type="datetimeFigureOut">
               <a:rPr lang="es-ES" smtClean="0"/>
-              <a:t>17/05/2021</a:t>
+              <a:t>23/05/2021</a:t>
             </a:fld>
             <a:endParaRPr lang="es-ES"/>
           </a:p>
@@ -2382,7 +2382,7 @@
           <a:p>
             <a:fld id="{23423902-E5F6-4A0D-9A81-A9BF902CCB85}" type="datetimeFigureOut">
               <a:rPr lang="es-ES" smtClean="0"/>
-              <a:t>17/05/2021</a:t>
+              <a:t>23/05/2021</a:t>
             </a:fld>
             <a:endParaRPr lang="es-ES"/>
           </a:p>
@@ -2670,7 +2670,7 @@
           <a:p>
             <a:fld id="{23423902-E5F6-4A0D-9A81-A9BF902CCB85}" type="datetimeFigureOut">
               <a:rPr lang="es-ES" smtClean="0"/>
-              <a:t>17/05/2021</a:t>
+              <a:t>23/05/2021</a:t>
             </a:fld>
             <a:endParaRPr lang="es-ES"/>
           </a:p>
@@ -2911,7 +2911,7 @@
           <a:p>
             <a:fld id="{23423902-E5F6-4A0D-9A81-A9BF902CCB85}" type="datetimeFigureOut">
               <a:rPr lang="es-ES" smtClean="0"/>
-              <a:t>17/05/2021</a:t>
+              <a:t>23/05/2021</a:t>
             </a:fld>
             <a:endParaRPr lang="es-ES"/>
           </a:p>
@@ -3465,7 +3465,7 @@
           <a:p>
             <a:r>
               <a:rPr lang="es-ES" dirty="0"/>
-              <a:t>-Buscar comida</a:t>
+              <a:t>-Buscar comida*</a:t>
             </a:r>
           </a:p>
           <a:p>
@@ -3477,13 +3477,18 @@
           <a:p>
             <a:r>
               <a:rPr lang="es-ES" dirty="0"/>
-              <a:t>-Detectar presa</a:t>
-            </a:r>
+              <a:t>-</a:t>
+            </a:r>
+            <a:r>
+              <a:rPr lang="es-ES"/>
+              <a:t>Detectar presa*</a:t>
+            </a:r>
+            <a:endParaRPr lang="es-ES" dirty="0"/>
           </a:p>
           <a:p>
             <a:r>
               <a:rPr lang="es-ES" dirty="0"/>
-              <a:t>-Domesticarse</a:t>
+              <a:t>-Domesticarse*</a:t>
             </a:r>
           </a:p>
         </p:txBody>

</xml_diff>